<commit_message>
Added discount code and fixed the DbContext
</commit_message>
<xml_diff>
--- a/WebApplicationFactory/IADUNG.pptx
+++ b/WebApplicationFactory/IADUNG.pptx
@@ -5,7 +5,7 @@
     <p:sldMasterId id="2147483648" r:id="rId1"/>
   </p:sldMasterIdLst>
   <p:notesMasterIdLst>
-    <p:notesMasterId r:id="rId20"/>
+    <p:notesMasterId r:id="rId21"/>
   </p:notesMasterIdLst>
   <p:sldIdLst>
     <p:sldId id="270" r:id="rId2"/>
@@ -18,14 +18,15 @@
     <p:sldId id="283" r:id="rId9"/>
     <p:sldId id="306" r:id="rId10"/>
     <p:sldId id="307" r:id="rId11"/>
-    <p:sldId id="285" r:id="rId12"/>
-    <p:sldId id="305" r:id="rId13"/>
-    <p:sldId id="286" r:id="rId14"/>
-    <p:sldId id="308" r:id="rId15"/>
-    <p:sldId id="309" r:id="rId16"/>
-    <p:sldId id="288" r:id="rId17"/>
-    <p:sldId id="274" r:id="rId18"/>
-    <p:sldId id="282" r:id="rId19"/>
+    <p:sldId id="308" r:id="rId12"/>
+    <p:sldId id="310" r:id="rId13"/>
+    <p:sldId id="309" r:id="rId14"/>
+    <p:sldId id="285" r:id="rId15"/>
+    <p:sldId id="305" r:id="rId16"/>
+    <p:sldId id="286" r:id="rId17"/>
+    <p:sldId id="288" r:id="rId18"/>
+    <p:sldId id="274" r:id="rId19"/>
+    <p:sldId id="282" r:id="rId20"/>
   </p:sldIdLst>
   <p:sldSz cx="12192000" cy="6858000"/>
   <p:notesSz cx="6858000" cy="9144000"/>
@@ -217,7 +218,7 @@
           <a:p>
             <a:fld id="{B234A0A9-D2B9-4D21-8054-CE3E8EA3318B}" type="datetimeFigureOut">
               <a:rPr lang="en-US" smtClean="0"/>
-              <a:t>4/14/2021</a:t>
+              <a:t>5/6/2021</a:t>
             </a:fld>
             <a:endParaRPr lang="en-US"/>
           </a:p>
@@ -799,7 +800,7 @@
           <a:p>
             <a:fld id="{0BDAA80A-DCF6-416C-B4E9-4897677234EE}" type="datetimeFigureOut">
               <a:rPr lang="en-US" smtClean="0"/>
-              <a:t>4/14/2021</a:t>
+              <a:t>5/6/2021</a:t>
             </a:fld>
             <a:endParaRPr lang="en-US"/>
           </a:p>
@@ -997,7 +998,7 @@
           <a:p>
             <a:fld id="{0BDAA80A-DCF6-416C-B4E9-4897677234EE}" type="datetimeFigureOut">
               <a:rPr lang="en-US" smtClean="0"/>
-              <a:t>4/14/2021</a:t>
+              <a:t>5/6/2021</a:t>
             </a:fld>
             <a:endParaRPr lang="en-US"/>
           </a:p>
@@ -1205,7 +1206,7 @@
           <a:p>
             <a:fld id="{0BDAA80A-DCF6-416C-B4E9-4897677234EE}" type="datetimeFigureOut">
               <a:rPr lang="en-US" smtClean="0"/>
-              <a:t>4/14/2021</a:t>
+              <a:t>5/6/2021</a:t>
             </a:fld>
             <a:endParaRPr lang="en-US"/>
           </a:p>
@@ -1403,7 +1404,7 @@
           <a:p>
             <a:fld id="{0BDAA80A-DCF6-416C-B4E9-4897677234EE}" type="datetimeFigureOut">
               <a:rPr lang="en-US" smtClean="0"/>
-              <a:t>4/14/2021</a:t>
+              <a:t>5/6/2021</a:t>
             </a:fld>
             <a:endParaRPr lang="en-US"/>
           </a:p>
@@ -1678,7 +1679,7 @@
           <a:p>
             <a:fld id="{0BDAA80A-DCF6-416C-B4E9-4897677234EE}" type="datetimeFigureOut">
               <a:rPr lang="en-US" smtClean="0"/>
-              <a:t>4/14/2021</a:t>
+              <a:t>5/6/2021</a:t>
             </a:fld>
             <a:endParaRPr lang="en-US"/>
           </a:p>
@@ -1943,7 +1944,7 @@
           <a:p>
             <a:fld id="{0BDAA80A-DCF6-416C-B4E9-4897677234EE}" type="datetimeFigureOut">
               <a:rPr lang="en-US" smtClean="0"/>
-              <a:t>4/14/2021</a:t>
+              <a:t>5/6/2021</a:t>
             </a:fld>
             <a:endParaRPr lang="en-US"/>
           </a:p>
@@ -2355,7 +2356,7 @@
           <a:p>
             <a:fld id="{0BDAA80A-DCF6-416C-B4E9-4897677234EE}" type="datetimeFigureOut">
               <a:rPr lang="en-US" smtClean="0"/>
-              <a:t>4/14/2021</a:t>
+              <a:t>5/6/2021</a:t>
             </a:fld>
             <a:endParaRPr lang="en-US"/>
           </a:p>
@@ -2496,7 +2497,7 @@
           <a:p>
             <a:fld id="{0BDAA80A-DCF6-416C-B4E9-4897677234EE}" type="datetimeFigureOut">
               <a:rPr lang="en-US" smtClean="0"/>
-              <a:t>4/14/2021</a:t>
+              <a:t>5/6/2021</a:t>
             </a:fld>
             <a:endParaRPr lang="en-US"/>
           </a:p>
@@ -2609,7 +2610,7 @@
           <a:p>
             <a:fld id="{0BDAA80A-DCF6-416C-B4E9-4897677234EE}" type="datetimeFigureOut">
               <a:rPr lang="en-US" smtClean="0"/>
-              <a:t>4/14/2021</a:t>
+              <a:t>5/6/2021</a:t>
             </a:fld>
             <a:endParaRPr lang="en-US"/>
           </a:p>
@@ -2920,7 +2921,7 @@
           <a:p>
             <a:fld id="{0BDAA80A-DCF6-416C-B4E9-4897677234EE}" type="datetimeFigureOut">
               <a:rPr lang="en-US" smtClean="0"/>
-              <a:t>4/14/2021</a:t>
+              <a:t>5/6/2021</a:t>
             </a:fld>
             <a:endParaRPr lang="en-US"/>
           </a:p>
@@ -3208,7 +3209,7 @@
           <a:p>
             <a:fld id="{0BDAA80A-DCF6-416C-B4E9-4897677234EE}" type="datetimeFigureOut">
               <a:rPr lang="en-US" smtClean="0"/>
-              <a:t>4/14/2021</a:t>
+              <a:t>5/6/2021</a:t>
             </a:fld>
             <a:endParaRPr lang="en-US"/>
           </a:p>
@@ -3449,7 +3450,7 @@
           <a:p>
             <a:fld id="{0BDAA80A-DCF6-416C-B4E9-4897677234EE}" type="datetimeFigureOut">
               <a:rPr lang="en-US" smtClean="0"/>
-              <a:t>4/14/2021</a:t>
+              <a:t>5/6/2021</a:t>
             </a:fld>
             <a:endParaRPr lang="en-US"/>
           </a:p>
@@ -4290,6 +4291,513 @@
                   </a:schemeClr>
                 </a:solidFill>
               </a:rPr>
+              <a:t>InMemoryApi</a:t>
+            </a:r>
+            <a:r>
+              <a:rPr lang="en-US" dirty="0">
+                <a:solidFill>
+                  <a:schemeClr val="accent5">
+                    <a:lumMod val="50000"/>
+                  </a:schemeClr>
+                </a:solidFill>
+              </a:rPr>
+              <a:t> Custom Class</a:t>
+            </a:r>
+          </a:p>
+        </p:txBody>
+      </p:sp>
+      <p:sp>
+        <p:nvSpPr>
+          <p:cNvPr id="3" name="Content Placeholder 2">
+            <a:extLst>
+              <a:ext uri="{FF2B5EF4-FFF2-40B4-BE49-F238E27FC236}">
+                <a16:creationId xmlns:a16="http://schemas.microsoft.com/office/drawing/2014/main" id="{247EFD57-A438-4A13-8DBA-921614D65879}"/>
+              </a:ext>
+            </a:extLst>
+          </p:cNvPr>
+          <p:cNvSpPr>
+            <a:spLocks noGrp="1"/>
+          </p:cNvSpPr>
+          <p:nvPr>
+            <p:ph idx="1"/>
+          </p:nvPr>
+        </p:nvSpPr>
+        <p:spPr/>
+        <p:txBody>
+          <a:bodyPr>
+            <a:normAutofit/>
+          </a:bodyPr>
+          <a:lstStyle/>
+          <a:p>
+            <a:r>
+              <a:rPr lang="en-US" dirty="0">
+                <a:solidFill>
+                  <a:schemeClr val="accent5">
+                    <a:lumMod val="50000"/>
+                  </a:schemeClr>
+                </a:solidFill>
+              </a:rPr>
+              <a:t>Create a class that will contain the </a:t>
+            </a:r>
+            <a:r>
+              <a:rPr lang="en-US" dirty="0" err="1">
+                <a:solidFill>
+                  <a:schemeClr val="accent5">
+                    <a:lumMod val="50000"/>
+                  </a:schemeClr>
+                </a:solidFill>
+              </a:rPr>
+              <a:t>WebApplicationFactory</a:t>
+            </a:r>
+            <a:r>
+              <a:rPr lang="en-US" dirty="0">
+                <a:solidFill>
+                  <a:schemeClr val="accent5">
+                    <a:lumMod val="50000"/>
+                  </a:schemeClr>
+                </a:solidFill>
+              </a:rPr>
+              <a:t> object </a:t>
+            </a:r>
+          </a:p>
+          <a:p>
+            <a:endParaRPr lang="en-US" dirty="0">
+              <a:solidFill>
+                <a:schemeClr val="accent5">
+                  <a:lumMod val="50000"/>
+                </a:schemeClr>
+              </a:solidFill>
+            </a:endParaRPr>
+          </a:p>
+          <a:p>
+            <a:endParaRPr lang="en-US" dirty="0">
+              <a:solidFill>
+                <a:schemeClr val="accent5">
+                  <a:lumMod val="50000"/>
+                </a:schemeClr>
+              </a:solidFill>
+            </a:endParaRPr>
+          </a:p>
+        </p:txBody>
+      </p:sp>
+      <p:pic>
+        <p:nvPicPr>
+          <p:cNvPr id="7" name="Picture 6">
+            <a:extLst>
+              <a:ext uri="{FF2B5EF4-FFF2-40B4-BE49-F238E27FC236}">
+                <a16:creationId xmlns:a16="http://schemas.microsoft.com/office/drawing/2014/main" id="{F5BEAADF-F9D8-4BE2-B34A-D2ABD3BADA60}"/>
+              </a:ext>
+            </a:extLst>
+          </p:cNvPr>
+          <p:cNvPicPr>
+            <a:picLocks noChangeAspect="1"/>
+          </p:cNvPicPr>
+          <p:nvPr/>
+        </p:nvPicPr>
+        <p:blipFill>
+          <a:blip r:embed="rId2"/>
+          <a:stretch>
+            <a:fillRect/>
+          </a:stretch>
+        </p:blipFill>
+        <p:spPr>
+          <a:xfrm>
+            <a:off x="4249308" y="2319638"/>
+            <a:ext cx="6884130" cy="4529863"/>
+          </a:xfrm>
+          <a:prstGeom prst="rect">
+            <a:avLst/>
+          </a:prstGeom>
+        </p:spPr>
+      </p:pic>
+    </p:spTree>
+    <p:extLst>
+      <p:ext uri="{BB962C8B-B14F-4D97-AF65-F5344CB8AC3E}">
+        <p14:creationId xmlns:p14="http://schemas.microsoft.com/office/powerpoint/2010/main" val="40509677"/>
+      </p:ext>
+    </p:extLst>
+  </p:cSld>
+  <p:clrMapOvr>
+    <a:masterClrMapping/>
+  </p:clrMapOvr>
+</p:sld>
+</file>
+
+<file path=ppt/slides/slide12.xml><?xml version="1.0" encoding="utf-8"?>
+<p:sld xmlns:a="http://schemas.openxmlformats.org/drawingml/2006/main" xmlns:r="http://schemas.openxmlformats.org/officeDocument/2006/relationships" xmlns:p="http://schemas.openxmlformats.org/presentationml/2006/main">
+  <p:cSld>
+    <p:spTree>
+      <p:nvGrpSpPr>
+        <p:cNvPr id="1" name=""/>
+        <p:cNvGrpSpPr/>
+        <p:nvPr/>
+      </p:nvGrpSpPr>
+      <p:grpSpPr>
+        <a:xfrm>
+          <a:off x="0" y="0"/>
+          <a:ext cx="0" cy="0"/>
+          <a:chOff x="0" y="0"/>
+          <a:chExt cx="0" cy="0"/>
+        </a:xfrm>
+      </p:grpSpPr>
+      <p:sp>
+        <p:nvSpPr>
+          <p:cNvPr id="2" name="Title 1">
+            <a:extLst>
+              <a:ext uri="{FF2B5EF4-FFF2-40B4-BE49-F238E27FC236}">
+                <a16:creationId xmlns:a16="http://schemas.microsoft.com/office/drawing/2014/main" id="{C5E8972D-19AF-4770-965A-06EA79781A2B}"/>
+              </a:ext>
+            </a:extLst>
+          </p:cNvPr>
+          <p:cNvSpPr>
+            <a:spLocks noGrp="1"/>
+          </p:cNvSpPr>
+          <p:nvPr>
+            <p:ph type="title"/>
+          </p:nvPr>
+        </p:nvSpPr>
+        <p:spPr/>
+        <p:txBody>
+          <a:bodyPr/>
+          <a:lstStyle/>
+          <a:p>
+            <a:r>
+              <a:rPr lang="en-US" dirty="0" err="1">
+                <a:solidFill>
+                  <a:schemeClr val="accent5">
+                    <a:lumMod val="50000"/>
+                  </a:schemeClr>
+                </a:solidFill>
+              </a:rPr>
+              <a:t>IClassFixture</a:t>
+            </a:r>
+            <a:r>
+              <a:rPr lang="en-US" dirty="0">
+                <a:solidFill>
+                  <a:schemeClr val="accent5">
+                    <a:lumMod val="50000"/>
+                  </a:schemeClr>
+                </a:solidFill>
+              </a:rPr>
+              <a:t>&lt;T&gt;</a:t>
+            </a:r>
+          </a:p>
+        </p:txBody>
+      </p:sp>
+      <p:sp>
+        <p:nvSpPr>
+          <p:cNvPr id="3" name="Content Placeholder 2">
+            <a:extLst>
+              <a:ext uri="{FF2B5EF4-FFF2-40B4-BE49-F238E27FC236}">
+                <a16:creationId xmlns:a16="http://schemas.microsoft.com/office/drawing/2014/main" id="{247EFD57-A438-4A13-8DBA-921614D65879}"/>
+              </a:ext>
+            </a:extLst>
+          </p:cNvPr>
+          <p:cNvSpPr>
+            <a:spLocks noGrp="1"/>
+          </p:cNvSpPr>
+          <p:nvPr>
+            <p:ph idx="1"/>
+          </p:nvPr>
+        </p:nvSpPr>
+        <p:spPr/>
+        <p:txBody>
+          <a:bodyPr>
+            <a:normAutofit/>
+          </a:bodyPr>
+          <a:lstStyle/>
+          <a:p>
+            <a:r>
+              <a:rPr lang="en-US" dirty="0">
+                <a:solidFill>
+                  <a:schemeClr val="accent5">
+                    <a:lumMod val="50000"/>
+                  </a:schemeClr>
+                </a:solidFill>
+              </a:rPr>
+              <a:t>To share a single context across all tests in the class</a:t>
+            </a:r>
+          </a:p>
+          <a:p>
+            <a:r>
+              <a:rPr lang="en-US" dirty="0">
+                <a:solidFill>
+                  <a:schemeClr val="accent5">
+                    <a:lumMod val="50000"/>
+                  </a:schemeClr>
+                </a:solidFill>
+              </a:rPr>
+              <a:t>Will initialize T at the start of the first test</a:t>
+            </a:r>
+          </a:p>
+          <a:p>
+            <a:endParaRPr lang="en-US" dirty="0">
+              <a:solidFill>
+                <a:schemeClr val="accent5">
+                  <a:lumMod val="50000"/>
+                </a:schemeClr>
+              </a:solidFill>
+            </a:endParaRPr>
+          </a:p>
+          <a:p>
+            <a:endParaRPr lang="en-US" dirty="0">
+              <a:solidFill>
+                <a:schemeClr val="accent5">
+                  <a:lumMod val="50000"/>
+                </a:schemeClr>
+              </a:solidFill>
+            </a:endParaRPr>
+          </a:p>
+        </p:txBody>
+      </p:sp>
+    </p:spTree>
+    <p:extLst>
+      <p:ext uri="{BB962C8B-B14F-4D97-AF65-F5344CB8AC3E}">
+        <p14:creationId xmlns:p14="http://schemas.microsoft.com/office/powerpoint/2010/main" val="2205074317"/>
+      </p:ext>
+    </p:extLst>
+  </p:cSld>
+  <p:clrMapOvr>
+    <a:masterClrMapping/>
+  </p:clrMapOvr>
+</p:sld>
+</file>
+
+<file path=ppt/slides/slide13.xml><?xml version="1.0" encoding="utf-8"?>
+<p:sld xmlns:a="http://schemas.openxmlformats.org/drawingml/2006/main" xmlns:r="http://schemas.openxmlformats.org/officeDocument/2006/relationships" xmlns:p="http://schemas.openxmlformats.org/presentationml/2006/main">
+  <p:cSld>
+    <p:spTree>
+      <p:nvGrpSpPr>
+        <p:cNvPr id="1" name=""/>
+        <p:cNvGrpSpPr/>
+        <p:nvPr/>
+      </p:nvGrpSpPr>
+      <p:grpSpPr>
+        <a:xfrm>
+          <a:off x="0" y="0"/>
+          <a:ext cx="0" cy="0"/>
+          <a:chOff x="0" y="0"/>
+          <a:chExt cx="0" cy="0"/>
+        </a:xfrm>
+      </p:grpSpPr>
+      <p:sp>
+        <p:nvSpPr>
+          <p:cNvPr id="2" name="Title 1">
+            <a:extLst>
+              <a:ext uri="{FF2B5EF4-FFF2-40B4-BE49-F238E27FC236}">
+                <a16:creationId xmlns:a16="http://schemas.microsoft.com/office/drawing/2014/main" id="{C5E8972D-19AF-4770-965A-06EA79781A2B}"/>
+              </a:ext>
+            </a:extLst>
+          </p:cNvPr>
+          <p:cNvSpPr>
+            <a:spLocks noGrp="1"/>
+          </p:cNvSpPr>
+          <p:nvPr>
+            <p:ph type="title"/>
+          </p:nvPr>
+        </p:nvSpPr>
+        <p:spPr/>
+        <p:txBody>
+          <a:bodyPr/>
+          <a:lstStyle/>
+          <a:p>
+            <a:r>
+              <a:rPr lang="en-US" dirty="0" err="1">
+                <a:solidFill>
+                  <a:schemeClr val="accent5">
+                    <a:lumMod val="50000"/>
+                  </a:schemeClr>
+                </a:solidFill>
+              </a:rPr>
+              <a:t>IClassFixture</a:t>
+            </a:r>
+            <a:r>
+              <a:rPr lang="en-US" dirty="0">
+                <a:solidFill>
+                  <a:schemeClr val="accent5">
+                    <a:lumMod val="50000"/>
+                  </a:schemeClr>
+                </a:solidFill>
+              </a:rPr>
+              <a:t>: Test Class</a:t>
+            </a:r>
+          </a:p>
+        </p:txBody>
+      </p:sp>
+      <p:sp>
+        <p:nvSpPr>
+          <p:cNvPr id="3" name="Content Placeholder 2">
+            <a:extLst>
+              <a:ext uri="{FF2B5EF4-FFF2-40B4-BE49-F238E27FC236}">
+                <a16:creationId xmlns:a16="http://schemas.microsoft.com/office/drawing/2014/main" id="{247EFD57-A438-4A13-8DBA-921614D65879}"/>
+              </a:ext>
+            </a:extLst>
+          </p:cNvPr>
+          <p:cNvSpPr>
+            <a:spLocks noGrp="1"/>
+          </p:cNvSpPr>
+          <p:nvPr>
+            <p:ph idx="1"/>
+          </p:nvPr>
+        </p:nvSpPr>
+        <p:spPr/>
+        <p:txBody>
+          <a:bodyPr>
+            <a:normAutofit/>
+          </a:bodyPr>
+          <a:lstStyle/>
+          <a:p>
+            <a:r>
+              <a:rPr lang="en-US" dirty="0">
+                <a:solidFill>
+                  <a:schemeClr val="accent5">
+                    <a:lumMod val="50000"/>
+                  </a:schemeClr>
+                </a:solidFill>
+              </a:rPr>
+              <a:t>Using the </a:t>
+            </a:r>
+            <a:r>
+              <a:rPr lang="en-US" dirty="0" err="1">
+                <a:solidFill>
+                  <a:schemeClr val="accent5">
+                    <a:lumMod val="50000"/>
+                  </a:schemeClr>
+                </a:solidFill>
+              </a:rPr>
+              <a:t>WebApplicationFactory</a:t>
+            </a:r>
+            <a:r>
+              <a:rPr lang="en-US" dirty="0">
+                <a:solidFill>
+                  <a:schemeClr val="accent5">
+                    <a:lumMod val="50000"/>
+                  </a:schemeClr>
+                </a:solidFill>
+              </a:rPr>
+              <a:t> (</a:t>
+            </a:r>
+            <a:r>
+              <a:rPr lang="en-US" dirty="0" err="1">
+                <a:solidFill>
+                  <a:schemeClr val="accent5">
+                    <a:lumMod val="50000"/>
+                  </a:schemeClr>
+                </a:solidFill>
+              </a:rPr>
+              <a:t>InMemoryApi</a:t>
+            </a:r>
+            <a:r>
+              <a:rPr lang="en-US" dirty="0">
+                <a:solidFill>
+                  <a:schemeClr val="accent5">
+                    <a:lumMod val="50000"/>
+                  </a:schemeClr>
+                </a:solidFill>
+              </a:rPr>
+              <a:t>)</a:t>
+            </a:r>
+          </a:p>
+          <a:p>
+            <a:endParaRPr lang="en-US" dirty="0">
+              <a:solidFill>
+                <a:schemeClr val="accent5">
+                  <a:lumMod val="50000"/>
+                </a:schemeClr>
+              </a:solidFill>
+            </a:endParaRPr>
+          </a:p>
+        </p:txBody>
+      </p:sp>
+      <p:pic>
+        <p:nvPicPr>
+          <p:cNvPr id="6" name="Picture 5">
+            <a:extLst>
+              <a:ext uri="{FF2B5EF4-FFF2-40B4-BE49-F238E27FC236}">
+                <a16:creationId xmlns:a16="http://schemas.microsoft.com/office/drawing/2014/main" id="{0D7F5CF0-6598-49A2-BB95-C15E60388366}"/>
+              </a:ext>
+            </a:extLst>
+          </p:cNvPr>
+          <p:cNvPicPr>
+            <a:picLocks noChangeAspect="1"/>
+          </p:cNvPicPr>
+          <p:nvPr/>
+        </p:nvPicPr>
+        <p:blipFill>
+          <a:blip r:embed="rId2"/>
+          <a:stretch>
+            <a:fillRect/>
+          </a:stretch>
+        </p:blipFill>
+        <p:spPr>
+          <a:xfrm>
+            <a:off x="3517359" y="2364045"/>
+            <a:ext cx="8570509" cy="4351338"/>
+          </a:xfrm>
+          <a:prstGeom prst="rect">
+            <a:avLst/>
+          </a:prstGeom>
+        </p:spPr>
+      </p:pic>
+    </p:spTree>
+    <p:extLst>
+      <p:ext uri="{BB962C8B-B14F-4D97-AF65-F5344CB8AC3E}">
+        <p14:creationId xmlns:p14="http://schemas.microsoft.com/office/powerpoint/2010/main" val="1900109623"/>
+      </p:ext>
+    </p:extLst>
+  </p:cSld>
+  <p:clrMapOvr>
+    <a:masterClrMapping/>
+  </p:clrMapOvr>
+</p:sld>
+</file>
+
+<file path=ppt/slides/slide14.xml><?xml version="1.0" encoding="utf-8"?>
+<p:sld xmlns:a="http://schemas.openxmlformats.org/drawingml/2006/main" xmlns:r="http://schemas.openxmlformats.org/officeDocument/2006/relationships" xmlns:p="http://schemas.openxmlformats.org/presentationml/2006/main">
+  <p:cSld>
+    <p:spTree>
+      <p:nvGrpSpPr>
+        <p:cNvPr id="1" name=""/>
+        <p:cNvGrpSpPr/>
+        <p:nvPr/>
+      </p:nvGrpSpPr>
+      <p:grpSpPr>
+        <a:xfrm>
+          <a:off x="0" y="0"/>
+          <a:ext cx="0" cy="0"/>
+          <a:chOff x="0" y="0"/>
+          <a:chExt cx="0" cy="0"/>
+        </a:xfrm>
+      </p:grpSpPr>
+      <p:sp>
+        <p:nvSpPr>
+          <p:cNvPr id="2" name="Title 1">
+            <a:extLst>
+              <a:ext uri="{FF2B5EF4-FFF2-40B4-BE49-F238E27FC236}">
+                <a16:creationId xmlns:a16="http://schemas.microsoft.com/office/drawing/2014/main" id="{C5E8972D-19AF-4770-965A-06EA79781A2B}"/>
+              </a:ext>
+            </a:extLst>
+          </p:cNvPr>
+          <p:cNvSpPr>
+            <a:spLocks noGrp="1"/>
+          </p:cNvSpPr>
+          <p:nvPr>
+            <p:ph type="title"/>
+          </p:nvPr>
+        </p:nvSpPr>
+        <p:spPr/>
+        <p:txBody>
+          <a:bodyPr/>
+          <a:lstStyle/>
+          <a:p>
+            <a:r>
+              <a:rPr lang="en-US" dirty="0" err="1">
+                <a:solidFill>
+                  <a:schemeClr val="accent5">
+                    <a:lumMod val="50000"/>
+                  </a:schemeClr>
+                </a:solidFill>
+              </a:rPr>
               <a:t>WebApplicationFactory</a:t>
             </a:r>
             <a:endParaRPr lang="en-US" dirty="0">
@@ -4385,7 +4893,7 @@
 </p:sld>
 </file>
 
-<file path=ppt/slides/slide12.xml><?xml version="1.0" encoding="utf-8"?>
+<file path=ppt/slides/slide15.xml><?xml version="1.0" encoding="utf-8"?>
 <p:sld xmlns:a="http://schemas.openxmlformats.org/drawingml/2006/main" xmlns:r="http://schemas.openxmlformats.org/officeDocument/2006/relationships" xmlns:p="http://schemas.openxmlformats.org/presentationml/2006/main">
   <p:cSld>
     <p:spTree>
@@ -4540,7 +5048,7 @@
 </p:sld>
 </file>
 
-<file path=ppt/slides/slide13.xml><?xml version="1.0" encoding="utf-8"?>
+<file path=ppt/slides/slide16.xml><?xml version="1.0" encoding="utf-8"?>
 <p:sld xmlns:a="http://schemas.openxmlformats.org/drawingml/2006/main" xmlns:r="http://schemas.openxmlformats.org/officeDocument/2006/relationships" xmlns:p="http://schemas.openxmlformats.org/presentationml/2006/main">
   <p:cSld>
     <p:spTree>
@@ -4689,499 +5197,6 @@
 </p:sld>
 </file>
 
-<file path=ppt/slides/slide14.xml><?xml version="1.0" encoding="utf-8"?>
-<p:sld xmlns:a="http://schemas.openxmlformats.org/drawingml/2006/main" xmlns:r="http://schemas.openxmlformats.org/officeDocument/2006/relationships" xmlns:p="http://schemas.openxmlformats.org/presentationml/2006/main">
-  <p:cSld>
-    <p:spTree>
-      <p:nvGrpSpPr>
-        <p:cNvPr id="1" name=""/>
-        <p:cNvGrpSpPr/>
-        <p:nvPr/>
-      </p:nvGrpSpPr>
-      <p:grpSpPr>
-        <a:xfrm>
-          <a:off x="0" y="0"/>
-          <a:ext cx="0" cy="0"/>
-          <a:chOff x="0" y="0"/>
-          <a:chExt cx="0" cy="0"/>
-        </a:xfrm>
-      </p:grpSpPr>
-      <p:sp>
-        <p:nvSpPr>
-          <p:cNvPr id="2" name="Title 1">
-            <a:extLst>
-              <a:ext uri="{FF2B5EF4-FFF2-40B4-BE49-F238E27FC236}">
-                <a16:creationId xmlns:a16="http://schemas.microsoft.com/office/drawing/2014/main" id="{C5E8972D-19AF-4770-965A-06EA79781A2B}"/>
-              </a:ext>
-            </a:extLst>
-          </p:cNvPr>
-          <p:cNvSpPr>
-            <a:spLocks noGrp="1"/>
-          </p:cNvSpPr>
-          <p:nvPr>
-            <p:ph type="title"/>
-          </p:nvPr>
-        </p:nvSpPr>
-        <p:spPr/>
-        <p:txBody>
-          <a:bodyPr/>
-          <a:lstStyle/>
-          <a:p>
-            <a:r>
-              <a:rPr lang="en-US" dirty="0" err="1">
-                <a:solidFill>
-                  <a:schemeClr val="accent5">
-                    <a:lumMod val="50000"/>
-                  </a:schemeClr>
-                </a:solidFill>
-              </a:rPr>
-              <a:t>IClassFixture</a:t>
-            </a:r>
-            <a:r>
-              <a:rPr lang="en-US" dirty="0">
-                <a:solidFill>
-                  <a:schemeClr val="accent5">
-                    <a:lumMod val="50000"/>
-                  </a:schemeClr>
-                </a:solidFill>
-              </a:rPr>
-              <a:t>&lt;T&gt;</a:t>
-            </a:r>
-          </a:p>
-        </p:txBody>
-      </p:sp>
-      <p:sp>
-        <p:nvSpPr>
-          <p:cNvPr id="3" name="Content Placeholder 2">
-            <a:extLst>
-              <a:ext uri="{FF2B5EF4-FFF2-40B4-BE49-F238E27FC236}">
-                <a16:creationId xmlns:a16="http://schemas.microsoft.com/office/drawing/2014/main" id="{247EFD57-A438-4A13-8DBA-921614D65879}"/>
-              </a:ext>
-            </a:extLst>
-          </p:cNvPr>
-          <p:cNvSpPr>
-            <a:spLocks noGrp="1"/>
-          </p:cNvSpPr>
-          <p:nvPr>
-            <p:ph idx="1"/>
-          </p:nvPr>
-        </p:nvSpPr>
-        <p:spPr/>
-        <p:txBody>
-          <a:bodyPr>
-            <a:normAutofit/>
-          </a:bodyPr>
-          <a:lstStyle/>
-          <a:p>
-            <a:r>
-              <a:rPr lang="en-US" dirty="0">
-                <a:solidFill>
-                  <a:schemeClr val="accent5">
-                    <a:lumMod val="50000"/>
-                  </a:schemeClr>
-                </a:solidFill>
-              </a:rPr>
-              <a:t>To share a single context across all tests in the class</a:t>
-            </a:r>
-          </a:p>
-          <a:p>
-            <a:r>
-              <a:rPr lang="en-US" dirty="0">
-                <a:solidFill>
-                  <a:schemeClr val="accent5">
-                    <a:lumMod val="50000"/>
-                  </a:schemeClr>
-                </a:solidFill>
-              </a:rPr>
-              <a:t>Will initialize T at the start of the first test</a:t>
-            </a:r>
-          </a:p>
-          <a:p>
-            <a:endParaRPr lang="en-US" dirty="0">
-              <a:solidFill>
-                <a:schemeClr val="accent5">
-                  <a:lumMod val="50000"/>
-                </a:schemeClr>
-              </a:solidFill>
-            </a:endParaRPr>
-          </a:p>
-          <a:p>
-            <a:endParaRPr lang="en-US" dirty="0">
-              <a:solidFill>
-                <a:schemeClr val="accent5">
-                  <a:lumMod val="50000"/>
-                </a:schemeClr>
-              </a:solidFill>
-            </a:endParaRPr>
-          </a:p>
-        </p:txBody>
-      </p:sp>
-    </p:spTree>
-    <p:extLst>
-      <p:ext uri="{BB962C8B-B14F-4D97-AF65-F5344CB8AC3E}">
-        <p14:creationId xmlns:p14="http://schemas.microsoft.com/office/powerpoint/2010/main" val="40509677"/>
-      </p:ext>
-    </p:extLst>
-  </p:cSld>
-  <p:clrMapOvr>
-    <a:masterClrMapping/>
-  </p:clrMapOvr>
-</p:sld>
-</file>
-
-<file path=ppt/slides/slide15.xml><?xml version="1.0" encoding="utf-8"?>
-<p:sld xmlns:a="http://schemas.openxmlformats.org/drawingml/2006/main" xmlns:r="http://schemas.openxmlformats.org/officeDocument/2006/relationships" xmlns:p="http://schemas.openxmlformats.org/presentationml/2006/main">
-  <p:cSld>
-    <p:spTree>
-      <p:nvGrpSpPr>
-        <p:cNvPr id="1" name=""/>
-        <p:cNvGrpSpPr/>
-        <p:nvPr/>
-      </p:nvGrpSpPr>
-      <p:grpSpPr>
-        <a:xfrm>
-          <a:off x="0" y="0"/>
-          <a:ext cx="0" cy="0"/>
-          <a:chOff x="0" y="0"/>
-          <a:chExt cx="0" cy="0"/>
-        </a:xfrm>
-      </p:grpSpPr>
-      <p:sp>
-        <p:nvSpPr>
-          <p:cNvPr id="2" name="Title 1">
-            <a:extLst>
-              <a:ext uri="{FF2B5EF4-FFF2-40B4-BE49-F238E27FC236}">
-                <a16:creationId xmlns:a16="http://schemas.microsoft.com/office/drawing/2014/main" id="{C5E8972D-19AF-4770-965A-06EA79781A2B}"/>
-              </a:ext>
-            </a:extLst>
-          </p:cNvPr>
-          <p:cNvSpPr>
-            <a:spLocks noGrp="1"/>
-          </p:cNvSpPr>
-          <p:nvPr>
-            <p:ph type="title"/>
-          </p:nvPr>
-        </p:nvSpPr>
-        <p:spPr/>
-        <p:txBody>
-          <a:bodyPr/>
-          <a:lstStyle/>
-          <a:p>
-            <a:r>
-              <a:rPr lang="en-US" dirty="0" err="1">
-                <a:solidFill>
-                  <a:schemeClr val="accent5">
-                    <a:lumMod val="50000"/>
-                  </a:schemeClr>
-                </a:solidFill>
-              </a:rPr>
-              <a:t>IClassFixture</a:t>
-            </a:r>
-            <a:r>
-              <a:rPr lang="en-US" dirty="0">
-                <a:solidFill>
-                  <a:schemeClr val="accent5">
-                    <a:lumMod val="50000"/>
-                  </a:schemeClr>
-                </a:solidFill>
-              </a:rPr>
-              <a:t>: Test Class</a:t>
-            </a:r>
-          </a:p>
-        </p:txBody>
-      </p:sp>
-      <p:sp>
-        <p:nvSpPr>
-          <p:cNvPr id="3" name="Content Placeholder 2">
-            <a:extLst>
-              <a:ext uri="{FF2B5EF4-FFF2-40B4-BE49-F238E27FC236}">
-                <a16:creationId xmlns:a16="http://schemas.microsoft.com/office/drawing/2014/main" id="{247EFD57-A438-4A13-8DBA-921614D65879}"/>
-              </a:ext>
-            </a:extLst>
-          </p:cNvPr>
-          <p:cNvSpPr>
-            <a:spLocks noGrp="1"/>
-          </p:cNvSpPr>
-          <p:nvPr>
-            <p:ph idx="1"/>
-          </p:nvPr>
-        </p:nvSpPr>
-        <p:spPr/>
-        <p:txBody>
-          <a:bodyPr>
-            <a:normAutofit/>
-          </a:bodyPr>
-          <a:lstStyle/>
-          <a:p>
-            <a:r>
-              <a:rPr lang="en-US" dirty="0">
-                <a:solidFill>
-                  <a:schemeClr val="accent5">
-                    <a:lumMod val="50000"/>
-                  </a:schemeClr>
-                </a:solidFill>
-              </a:rPr>
-              <a:t>Using the </a:t>
-            </a:r>
-            <a:r>
-              <a:rPr lang="en-US" dirty="0" err="1">
-                <a:solidFill>
-                  <a:schemeClr val="accent5">
-                    <a:lumMod val="50000"/>
-                  </a:schemeClr>
-                </a:solidFill>
-              </a:rPr>
-              <a:t>WebApplicationFactory</a:t>
-            </a:r>
-            <a:r>
-              <a:rPr lang="en-US" dirty="0">
-                <a:solidFill>
-                  <a:schemeClr val="accent5">
-                    <a:lumMod val="50000"/>
-                  </a:schemeClr>
-                </a:solidFill>
-              </a:rPr>
-              <a:t> (</a:t>
-            </a:r>
-            <a:r>
-              <a:rPr lang="en-US" dirty="0" err="1">
-                <a:solidFill>
-                  <a:schemeClr val="accent5">
-                    <a:lumMod val="50000"/>
-                  </a:schemeClr>
-                </a:solidFill>
-              </a:rPr>
-              <a:t>InMemoryApi</a:t>
-            </a:r>
-            <a:r>
-              <a:rPr lang="en-US" dirty="0">
-                <a:solidFill>
-                  <a:schemeClr val="accent5">
-                    <a:lumMod val="50000"/>
-                  </a:schemeClr>
-                </a:solidFill>
-              </a:rPr>
-              <a:t>)</a:t>
-            </a:r>
-          </a:p>
-          <a:p>
-            <a:endParaRPr lang="en-US" dirty="0">
-              <a:solidFill>
-                <a:schemeClr val="accent5">
-                  <a:lumMod val="50000"/>
-                </a:schemeClr>
-              </a:solidFill>
-            </a:endParaRPr>
-          </a:p>
-        </p:txBody>
-      </p:sp>
-      <p:pic>
-        <p:nvPicPr>
-          <p:cNvPr id="6" name="Picture 5">
-            <a:extLst>
-              <a:ext uri="{FF2B5EF4-FFF2-40B4-BE49-F238E27FC236}">
-                <a16:creationId xmlns:a16="http://schemas.microsoft.com/office/drawing/2014/main" id="{0D7F5CF0-6598-49A2-BB95-C15E60388366}"/>
-              </a:ext>
-            </a:extLst>
-          </p:cNvPr>
-          <p:cNvPicPr>
-            <a:picLocks noChangeAspect="1"/>
-          </p:cNvPicPr>
-          <p:nvPr/>
-        </p:nvPicPr>
-        <p:blipFill>
-          <a:blip r:embed="rId2"/>
-          <a:stretch>
-            <a:fillRect/>
-          </a:stretch>
-        </p:blipFill>
-        <p:spPr>
-          <a:xfrm>
-            <a:off x="3517359" y="2364045"/>
-            <a:ext cx="8570509" cy="4351338"/>
-          </a:xfrm>
-          <a:prstGeom prst="rect">
-            <a:avLst/>
-          </a:prstGeom>
-        </p:spPr>
-      </p:pic>
-    </p:spTree>
-    <p:extLst>
-      <p:ext uri="{BB962C8B-B14F-4D97-AF65-F5344CB8AC3E}">
-        <p14:creationId xmlns:p14="http://schemas.microsoft.com/office/powerpoint/2010/main" val="1900109623"/>
-      </p:ext>
-    </p:extLst>
-  </p:cSld>
-  <p:clrMapOvr>
-    <a:masterClrMapping/>
-  </p:clrMapOvr>
-</p:sld>
-</file>
-
-<file path=ppt/slides/slide16.xml><?xml version="1.0" encoding="utf-8"?>
-<p:sld xmlns:a="http://schemas.openxmlformats.org/drawingml/2006/main" xmlns:r="http://schemas.openxmlformats.org/officeDocument/2006/relationships" xmlns:p="http://schemas.openxmlformats.org/presentationml/2006/main">
-  <p:cSld>
-    <p:spTree>
-      <p:nvGrpSpPr>
-        <p:cNvPr id="1" name=""/>
-        <p:cNvGrpSpPr/>
-        <p:nvPr/>
-      </p:nvGrpSpPr>
-      <p:grpSpPr>
-        <a:xfrm>
-          <a:off x="0" y="0"/>
-          <a:ext cx="0" cy="0"/>
-          <a:chOff x="0" y="0"/>
-          <a:chExt cx="0" cy="0"/>
-        </a:xfrm>
-      </p:grpSpPr>
-      <p:sp>
-        <p:nvSpPr>
-          <p:cNvPr id="2" name="Title 1">
-            <a:extLst>
-              <a:ext uri="{FF2B5EF4-FFF2-40B4-BE49-F238E27FC236}">
-                <a16:creationId xmlns:a16="http://schemas.microsoft.com/office/drawing/2014/main" id="{C5E8972D-19AF-4770-965A-06EA79781A2B}"/>
-              </a:ext>
-            </a:extLst>
-          </p:cNvPr>
-          <p:cNvSpPr>
-            <a:spLocks noGrp="1"/>
-          </p:cNvSpPr>
-          <p:nvPr>
-            <p:ph type="title"/>
-          </p:nvPr>
-        </p:nvSpPr>
-        <p:spPr/>
-        <p:txBody>
-          <a:bodyPr/>
-          <a:lstStyle/>
-          <a:p>
-            <a:r>
-              <a:rPr lang="en-US" dirty="0">
-                <a:solidFill>
-                  <a:schemeClr val="accent5">
-                    <a:lumMod val="50000"/>
-                  </a:schemeClr>
-                </a:solidFill>
-              </a:rPr>
-              <a:t>Conclusion</a:t>
-            </a:r>
-          </a:p>
-        </p:txBody>
-      </p:sp>
-      <p:sp>
-        <p:nvSpPr>
-          <p:cNvPr id="3" name="Content Placeholder 2">
-            <a:extLst>
-              <a:ext uri="{FF2B5EF4-FFF2-40B4-BE49-F238E27FC236}">
-                <a16:creationId xmlns:a16="http://schemas.microsoft.com/office/drawing/2014/main" id="{247EFD57-A438-4A13-8DBA-921614D65879}"/>
-              </a:ext>
-            </a:extLst>
-          </p:cNvPr>
-          <p:cNvSpPr>
-            <a:spLocks noGrp="1"/>
-          </p:cNvSpPr>
-          <p:nvPr>
-            <p:ph idx="1"/>
-          </p:nvPr>
-        </p:nvSpPr>
-        <p:spPr/>
-        <p:txBody>
-          <a:bodyPr>
-            <a:normAutofit/>
-          </a:bodyPr>
-          <a:lstStyle/>
-          <a:p>
-            <a:r>
-              <a:rPr lang="en-US" dirty="0">
-                <a:solidFill>
-                  <a:schemeClr val="accent5">
-                    <a:lumMod val="50000"/>
-                  </a:schemeClr>
-                </a:solidFill>
-              </a:rPr>
-              <a:t>Simple-</a:t>
-            </a:r>
-            <a:r>
-              <a:rPr lang="en-US" dirty="0" err="1">
-                <a:solidFill>
-                  <a:schemeClr val="accent5">
-                    <a:lumMod val="50000"/>
-                  </a:schemeClr>
-                </a:solidFill>
-              </a:rPr>
-              <a:t>ish</a:t>
-            </a:r>
-            <a:endParaRPr lang="en-US" dirty="0">
-              <a:solidFill>
-                <a:schemeClr val="accent5">
-                  <a:lumMod val="50000"/>
-                </a:schemeClr>
-              </a:solidFill>
-            </a:endParaRPr>
-          </a:p>
-          <a:p>
-            <a:r>
-              <a:rPr lang="en-US" dirty="0">
-                <a:solidFill>
-                  <a:schemeClr val="accent5">
-                    <a:lumMod val="50000"/>
-                  </a:schemeClr>
-                </a:solidFill>
-              </a:rPr>
-              <a:t>Enables end to end testing in Visual Studio</a:t>
-            </a:r>
-          </a:p>
-          <a:p>
-            <a:pPr lvl="1"/>
-            <a:r>
-              <a:rPr lang="en-US" dirty="0">
-                <a:solidFill>
-                  <a:schemeClr val="accent5">
-                    <a:lumMod val="50000"/>
-                  </a:schemeClr>
-                </a:solidFill>
-              </a:rPr>
-              <a:t>Allows debugging</a:t>
-            </a:r>
-          </a:p>
-          <a:p>
-            <a:pPr lvl="1"/>
-            <a:r>
-              <a:rPr lang="en-US" dirty="0">
-                <a:solidFill>
-                  <a:schemeClr val="accent5">
-                    <a:lumMod val="50000"/>
-                  </a:schemeClr>
-                </a:solidFill>
-              </a:rPr>
-              <a:t>Don’t have to start VS and then run your test software</a:t>
-            </a:r>
-          </a:p>
-          <a:p>
-            <a:endParaRPr lang="en-US" dirty="0">
-              <a:solidFill>
-                <a:schemeClr val="accent5">
-                  <a:lumMod val="50000"/>
-                </a:schemeClr>
-              </a:solidFill>
-            </a:endParaRPr>
-          </a:p>
-        </p:txBody>
-      </p:sp>
-    </p:spTree>
-    <p:extLst>
-      <p:ext uri="{BB962C8B-B14F-4D97-AF65-F5344CB8AC3E}">
-        <p14:creationId xmlns:p14="http://schemas.microsoft.com/office/powerpoint/2010/main" val="2148422421"/>
-      </p:ext>
-    </p:extLst>
-  </p:cSld>
-  <p:clrMapOvr>
-    <a:masterClrMapping/>
-  </p:clrMapOvr>
-</p:sld>
-</file>
-
 <file path=ppt/slides/slide17.xml><?xml version="1.0" encoding="utf-8"?>
 <p:sld xmlns:a="http://schemas.openxmlformats.org/drawingml/2006/main" xmlns:r="http://schemas.openxmlformats.org/officeDocument/2006/relationships" xmlns:p="http://schemas.openxmlformats.org/presentationml/2006/main">
   <p:cSld>
@@ -5204,6 +5219,170 @@
           <p:cNvPr id="2" name="Title 1">
             <a:extLst>
               <a:ext uri="{FF2B5EF4-FFF2-40B4-BE49-F238E27FC236}">
+                <a16:creationId xmlns:a16="http://schemas.microsoft.com/office/drawing/2014/main" id="{C5E8972D-19AF-4770-965A-06EA79781A2B}"/>
+              </a:ext>
+            </a:extLst>
+          </p:cNvPr>
+          <p:cNvSpPr>
+            <a:spLocks noGrp="1"/>
+          </p:cNvSpPr>
+          <p:nvPr>
+            <p:ph type="title"/>
+          </p:nvPr>
+        </p:nvSpPr>
+        <p:spPr/>
+        <p:txBody>
+          <a:bodyPr/>
+          <a:lstStyle/>
+          <a:p>
+            <a:r>
+              <a:rPr lang="en-US" dirty="0">
+                <a:solidFill>
+                  <a:schemeClr val="accent5">
+                    <a:lumMod val="50000"/>
+                  </a:schemeClr>
+                </a:solidFill>
+              </a:rPr>
+              <a:t>Conclusion</a:t>
+            </a:r>
+          </a:p>
+        </p:txBody>
+      </p:sp>
+      <p:sp>
+        <p:nvSpPr>
+          <p:cNvPr id="3" name="Content Placeholder 2">
+            <a:extLst>
+              <a:ext uri="{FF2B5EF4-FFF2-40B4-BE49-F238E27FC236}">
+                <a16:creationId xmlns:a16="http://schemas.microsoft.com/office/drawing/2014/main" id="{247EFD57-A438-4A13-8DBA-921614D65879}"/>
+              </a:ext>
+            </a:extLst>
+          </p:cNvPr>
+          <p:cNvSpPr>
+            <a:spLocks noGrp="1"/>
+          </p:cNvSpPr>
+          <p:nvPr>
+            <p:ph idx="1"/>
+          </p:nvPr>
+        </p:nvSpPr>
+        <p:spPr/>
+        <p:txBody>
+          <a:bodyPr>
+            <a:normAutofit/>
+          </a:bodyPr>
+          <a:lstStyle/>
+          <a:p>
+            <a:r>
+              <a:rPr lang="en-US" dirty="0">
+                <a:solidFill>
+                  <a:schemeClr val="accent5">
+                    <a:lumMod val="50000"/>
+                  </a:schemeClr>
+                </a:solidFill>
+              </a:rPr>
+              <a:t>Simple-</a:t>
+            </a:r>
+            <a:r>
+              <a:rPr lang="en-US" dirty="0" err="1">
+                <a:solidFill>
+                  <a:schemeClr val="accent5">
+                    <a:lumMod val="50000"/>
+                  </a:schemeClr>
+                </a:solidFill>
+              </a:rPr>
+              <a:t>ish</a:t>
+            </a:r>
+            <a:endParaRPr lang="en-US" dirty="0">
+              <a:solidFill>
+                <a:schemeClr val="accent5">
+                  <a:lumMod val="50000"/>
+                </a:schemeClr>
+              </a:solidFill>
+            </a:endParaRPr>
+          </a:p>
+          <a:p>
+            <a:r>
+              <a:rPr lang="en-US" dirty="0">
+                <a:solidFill>
+                  <a:schemeClr val="accent5">
+                    <a:lumMod val="50000"/>
+                  </a:schemeClr>
+                </a:solidFill>
+              </a:rPr>
+              <a:t>Enables end to end testing in Visual Studio</a:t>
+            </a:r>
+          </a:p>
+          <a:p>
+            <a:pPr lvl="1"/>
+            <a:r>
+              <a:rPr lang="en-US" dirty="0">
+                <a:solidFill>
+                  <a:schemeClr val="accent5">
+                    <a:lumMod val="50000"/>
+                  </a:schemeClr>
+                </a:solidFill>
+              </a:rPr>
+              <a:t>Allows debugging</a:t>
+            </a:r>
+          </a:p>
+          <a:p>
+            <a:pPr lvl="1"/>
+            <a:r>
+              <a:rPr lang="en-US" dirty="0">
+                <a:solidFill>
+                  <a:schemeClr val="accent5">
+                    <a:lumMod val="50000"/>
+                  </a:schemeClr>
+                </a:solidFill>
+              </a:rPr>
+              <a:t>Don’t have to start VS and then run your test software</a:t>
+            </a:r>
+          </a:p>
+          <a:p>
+            <a:endParaRPr lang="en-US" dirty="0">
+              <a:solidFill>
+                <a:schemeClr val="accent5">
+                  <a:lumMod val="50000"/>
+                </a:schemeClr>
+              </a:solidFill>
+            </a:endParaRPr>
+          </a:p>
+        </p:txBody>
+      </p:sp>
+    </p:spTree>
+    <p:extLst>
+      <p:ext uri="{BB962C8B-B14F-4D97-AF65-F5344CB8AC3E}">
+        <p14:creationId xmlns:p14="http://schemas.microsoft.com/office/powerpoint/2010/main" val="2148422421"/>
+      </p:ext>
+    </p:extLst>
+  </p:cSld>
+  <p:clrMapOvr>
+    <a:masterClrMapping/>
+  </p:clrMapOvr>
+</p:sld>
+</file>
+
+<file path=ppt/slides/slide18.xml><?xml version="1.0" encoding="utf-8"?>
+<p:sld xmlns:a="http://schemas.openxmlformats.org/drawingml/2006/main" xmlns:r="http://schemas.openxmlformats.org/officeDocument/2006/relationships" xmlns:p="http://schemas.openxmlformats.org/presentationml/2006/main">
+  <p:cSld>
+    <p:spTree>
+      <p:nvGrpSpPr>
+        <p:cNvPr id="1" name=""/>
+        <p:cNvGrpSpPr/>
+        <p:nvPr/>
+      </p:nvGrpSpPr>
+      <p:grpSpPr>
+        <a:xfrm>
+          <a:off x="0" y="0"/>
+          <a:ext cx="0" cy="0"/>
+          <a:chOff x="0" y="0"/>
+          <a:chExt cx="0" cy="0"/>
+        </a:xfrm>
+      </p:grpSpPr>
+      <p:sp>
+        <p:nvSpPr>
+          <p:cNvPr id="2" name="Title 1">
+            <a:extLst>
+              <a:ext uri="{FF2B5EF4-FFF2-40B4-BE49-F238E27FC236}">
                 <a16:creationId xmlns:a16="http://schemas.microsoft.com/office/drawing/2014/main" id="{8E184895-4B3D-4D82-9AF9-B36996CDB0D5}"/>
               </a:ext>
             </a:extLst>
@@ -5377,7 +5556,7 @@
 </p:sld>
 </file>
 
-<file path=ppt/slides/slide18.xml><?xml version="1.0" encoding="utf-8"?>
+<file path=ppt/slides/slide19.xml><?xml version="1.0" encoding="utf-8"?>
 <p:sld xmlns:a="http://schemas.openxmlformats.org/drawingml/2006/main" xmlns:r="http://schemas.openxmlformats.org/officeDocument/2006/relationships" xmlns:p="http://schemas.openxmlformats.org/presentationml/2006/main">
   <p:cSld>
     <p:spTree>
@@ -6033,6 +6212,25 @@
               </a:rPr>
               <a:t>$49.99</a:t>
             </a:r>
+          </a:p>
+          <a:p>
+            <a:r>
+              <a:rPr lang="en-US">
+                <a:solidFill>
+                  <a:schemeClr val="accent5">
+                    <a:lumMod val="50000"/>
+                  </a:schemeClr>
+                </a:solidFill>
+              </a:rPr>
+              <a:t>hennis45: 45% off code</a:t>
+            </a:r>
+            <a:endParaRPr lang="en-US" dirty="0">
+              <a:solidFill>
+                <a:schemeClr val="accent5">
+                  <a:lumMod val="50000"/>
+                </a:schemeClr>
+              </a:solidFill>
+            </a:endParaRPr>
           </a:p>
           <a:p>
             <a:endParaRPr lang="en-US" dirty="0">
@@ -6194,6 +6392,18 @@
           </a:p>
           <a:p>
             <a:r>
+              <a:rPr lang="en-US" dirty="0">
+                <a:solidFill>
+                  <a:schemeClr val="accent5">
+                    <a:lumMod val="50000"/>
+                  </a:schemeClr>
+                </a:solidFill>
+              </a:rPr>
+              <a:t>Testing Custom Classes</a:t>
+            </a:r>
+          </a:p>
+          <a:p>
+            <a:r>
               <a:rPr lang="en-US" dirty="0" err="1">
                 <a:solidFill>
                   <a:schemeClr val="accent5">
@@ -6211,8 +6421,44 @@
                   </a:schemeClr>
                 </a:solidFill>
               </a:rPr>
-              <a:t> Custom Classes</a:t>
-            </a:r>
+              <a:t> </a:t>
+            </a:r>
+            <a:r>
+              <a:rPr lang="en-US" dirty="0" err="1">
+                <a:solidFill>
+                  <a:schemeClr val="accent5">
+                    <a:lumMod val="50000"/>
+                  </a:schemeClr>
+                </a:solidFill>
+              </a:rPr>
+              <a:t>IClassFixture</a:t>
+            </a:r>
+            <a:endParaRPr lang="en-US" dirty="0">
+              <a:solidFill>
+                <a:schemeClr val="accent5">
+                  <a:lumMod val="50000"/>
+                </a:schemeClr>
+              </a:solidFill>
+            </a:endParaRPr>
+          </a:p>
+          <a:p>
+            <a:r>
+              <a:rPr lang="en-US" dirty="0" err="1">
+                <a:solidFill>
+                  <a:schemeClr val="accent5">
+                    <a:lumMod val="50000"/>
+                  </a:schemeClr>
+                </a:solidFill>
+              </a:rPr>
+              <a:t>WebApplicationFactory</a:t>
+            </a:r>
+            <a:endParaRPr lang="en-US" dirty="0">
+              <a:solidFill>
+                <a:schemeClr val="accent5">
+                  <a:lumMod val="50000"/>
+                </a:schemeClr>
+              </a:solidFill>
+            </a:endParaRPr>
           </a:p>
           <a:p>
             <a:r>
@@ -6223,19 +6469,7 @@
                   </a:schemeClr>
                 </a:solidFill>
               </a:rPr>
-              <a:t>…  </a:t>
-            </a:r>
-          </a:p>
-          <a:p>
-            <a:r>
-              <a:rPr lang="en-US" dirty="0">
-                <a:solidFill>
-                  <a:schemeClr val="accent5">
-                    <a:lumMod val="50000"/>
-                  </a:schemeClr>
-                </a:solidFill>
-              </a:rPr>
-              <a:t>Profit</a:t>
+              <a:t>Conclusion</a:t>
             </a:r>
           </a:p>
           <a:p>
@@ -6537,10 +6771,10 @@
       </p:sp>
       <p:pic>
         <p:nvPicPr>
-          <p:cNvPr id="6" name="Picture 5">
-            <a:extLst>
-              <a:ext uri="{FF2B5EF4-FFF2-40B4-BE49-F238E27FC236}">
-                <a16:creationId xmlns:a16="http://schemas.microsoft.com/office/drawing/2014/main" id="{67BE621D-F553-4446-839D-2C51AB22DC83}"/>
+          <p:cNvPr id="7" name="Picture 6">
+            <a:extLst>
+              <a:ext uri="{FF2B5EF4-FFF2-40B4-BE49-F238E27FC236}">
+                <a16:creationId xmlns:a16="http://schemas.microsoft.com/office/drawing/2014/main" id="{C78134D0-712A-4E10-BDEC-E6AFB296EB39}"/>
               </a:ext>
             </a:extLst>
           </p:cNvPr>
@@ -6557,8 +6791,8 @@
         </p:blipFill>
         <p:spPr>
           <a:xfrm>
-            <a:off x="1075992" y="4555653"/>
-            <a:ext cx="10040016" cy="1683093"/>
+            <a:off x="1075992" y="1826419"/>
+            <a:ext cx="5907752" cy="1325562"/>
           </a:xfrm>
           <a:prstGeom prst="rect">
             <a:avLst/>
@@ -6567,10 +6801,10 @@
       </p:pic>
       <p:pic>
         <p:nvPicPr>
-          <p:cNvPr id="7" name="Picture 6">
-            <a:extLst>
-              <a:ext uri="{FF2B5EF4-FFF2-40B4-BE49-F238E27FC236}">
-                <a16:creationId xmlns:a16="http://schemas.microsoft.com/office/drawing/2014/main" id="{C78134D0-712A-4E10-BDEC-E6AFB296EB39}"/>
+          <p:cNvPr id="4" name="Picture 3">
+            <a:extLst>
+              <a:ext uri="{FF2B5EF4-FFF2-40B4-BE49-F238E27FC236}">
+                <a16:creationId xmlns:a16="http://schemas.microsoft.com/office/drawing/2014/main" id="{D9775D1F-B604-4792-B635-FDF32943FB20}"/>
               </a:ext>
             </a:extLst>
           </p:cNvPr>
@@ -6587,8 +6821,8 @@
         </p:blipFill>
         <p:spPr>
           <a:xfrm>
-            <a:off x="1075992" y="1826419"/>
-            <a:ext cx="5907752" cy="1325562"/>
+            <a:off x="1850296" y="4270804"/>
+            <a:ext cx="9321100" cy="1907574"/>
           </a:xfrm>
           <a:prstGeom prst="rect">
             <a:avLst/>

</xml_diff>